<commit_message>
Updated presentaiton for another overview image
</commit_message>
<xml_diff>
--- a/se_process/final_report/final_presentation.pptx
+++ b/se_process/final_report/final_presentation.pptx
@@ -5,7 +5,7 @@
     <p:sldMasterId id="2147483684" r:id="rId1"/>
   </p:sldMasterIdLst>
   <p:notesMasterIdLst>
-    <p:notesMasterId r:id="rId16"/>
+    <p:notesMasterId r:id="rId17"/>
   </p:notesMasterIdLst>
   <p:sldIdLst>
     <p:sldId id="256" r:id="rId2"/>
@@ -15,13 +15,14 @@
     <p:sldId id="264" r:id="rId6"/>
     <p:sldId id="286" r:id="rId7"/>
     <p:sldId id="287" r:id="rId8"/>
-    <p:sldId id="288" r:id="rId9"/>
-    <p:sldId id="290" r:id="rId10"/>
-    <p:sldId id="291" r:id="rId11"/>
-    <p:sldId id="292" r:id="rId12"/>
-    <p:sldId id="294" r:id="rId13"/>
-    <p:sldId id="295" r:id="rId14"/>
-    <p:sldId id="275" r:id="rId15"/>
+    <p:sldId id="296" r:id="rId9"/>
+    <p:sldId id="288" r:id="rId10"/>
+    <p:sldId id="290" r:id="rId11"/>
+    <p:sldId id="291" r:id="rId12"/>
+    <p:sldId id="292" r:id="rId13"/>
+    <p:sldId id="294" r:id="rId14"/>
+    <p:sldId id="295" r:id="rId15"/>
+    <p:sldId id="275" r:id="rId16"/>
   </p:sldIdLst>
   <p:sldSz cx="9144000" cy="6858000" type="screen4x3"/>
   <p:notesSz cx="6858000" cy="9144000"/>
@@ -3608,6 +3609,13 @@
   <p:clrMapOvr>
     <a:masterClrMapping/>
   </p:clrMapOvr>
+  <p:timing>
+    <p:tnLst>
+      <p:par>
+        <p:cTn xmlns:p14="http://schemas.microsoft.com/office/powerpoint/2010/main" id="1" dur="indefinite" restart="never" nodeType="tmRoot"/>
+      </p:par>
+    </p:tnLst>
+  </p:timing>
 </p:sld>
 </file>
 
@@ -3645,7 +3653,7 @@
           <a:p>
             <a:r>
               <a:rPr lang="en-US" dirty="0" smtClean="0"/>
-              <a:t>Validation Steps</a:t>
+              <a:t>Testing Steps</a:t>
             </a:r>
             <a:endParaRPr lang="en-US" dirty="0"/>
           </a:p>
@@ -3663,53 +3671,73 @@
         </p:nvSpPr>
         <p:spPr/>
         <p:txBody>
-          <a:bodyPr/>
-          <a:lstStyle/>
-          <a:p>
-            <a:r>
-              <a:rPr lang="en-US" dirty="0" smtClean="0"/>
-              <a:t>Met with Writers and Readers</a:t>
+          <a:bodyPr>
+            <a:normAutofit fontScale="92500" lnSpcReduction="20000"/>
+          </a:bodyPr>
+          <a:lstStyle/>
+          <a:p>
+            <a:r>
+              <a:rPr lang="en-US" dirty="0" smtClean="0"/>
+              <a:t>Testing Website</a:t>
             </a:r>
           </a:p>
           <a:p>
             <a:pPr lvl="1"/>
             <a:r>
               <a:rPr lang="en-US" dirty="0" smtClean="0"/>
-              <a:t>Comments / changes desired for system</a:t>
+              <a:t> Client and user testing, manual testing by visiting and exercising components</a:t>
+            </a:r>
+          </a:p>
+          <a:p>
+            <a:r>
+              <a:rPr lang="en-US" dirty="0" smtClean="0"/>
+              <a:t>Testing Drupal Extensions</a:t>
             </a:r>
           </a:p>
           <a:p>
             <a:pPr lvl="1"/>
             <a:r>
               <a:rPr lang="en-US" dirty="0" smtClean="0"/>
-              <a:t>Iterate</a:t>
-            </a:r>
-          </a:p>
-          <a:p>
-            <a:r>
-              <a:rPr lang="en-US" dirty="0" smtClean="0"/>
-              <a:t>Validation Meeting with Client</a:t>
+              <a:t>Manual testing by exercising all use cases and boundary cases of system</a:t>
+            </a:r>
+          </a:p>
+          <a:p>
+            <a:r>
+              <a:rPr lang="en-US" dirty="0" smtClean="0"/>
+              <a:t>Testing Shared Library</a:t>
             </a:r>
           </a:p>
           <a:p>
             <a:pPr lvl="1"/>
             <a:r>
               <a:rPr lang="en-US" dirty="0" smtClean="0"/>
-              <a:t>Demonstrated system to the client</a:t>
+              <a:t>Manual end to end tests as well as Unit testing</a:t>
+            </a:r>
+          </a:p>
+          <a:p>
+            <a:r>
+              <a:rPr lang="en-US" dirty="0" smtClean="0"/>
+              <a:t>Testing RSS Parsing</a:t>
             </a:r>
           </a:p>
           <a:p>
             <a:pPr lvl="1"/>
             <a:r>
               <a:rPr lang="en-US" dirty="0" smtClean="0"/>
-              <a:t>Asked what changes he would like</a:t>
+              <a:t>Manual end to end tests</a:t>
+            </a:r>
+          </a:p>
+          <a:p>
+            <a:r>
+              <a:rPr lang="en-US" dirty="0" smtClean="0"/>
+              <a:t>Testing Data Fusion</a:t>
             </a:r>
           </a:p>
           <a:p>
             <a:pPr lvl="1"/>
             <a:r>
               <a:rPr lang="en-US" dirty="0" smtClean="0"/>
-              <a:t>Iterated until he was 100% happy</a:t>
+              <a:t>Manual end to end tests with example fusion</a:t>
             </a:r>
             <a:endParaRPr lang="en-US" dirty="0"/>
           </a:p>
@@ -3718,13 +3746,20 @@
     </p:spTree>
     <p:extLst>
       <p:ext uri="{BB962C8B-B14F-4D97-AF65-F5344CB8AC3E}">
-        <p14:creationId xmlns:p14="http://schemas.microsoft.com/office/powerpoint/2010/main" val="2464982024"/>
+        <p14:creationId xmlns:p14="http://schemas.microsoft.com/office/powerpoint/2010/main" val="2262376755"/>
       </p:ext>
     </p:extLst>
   </p:cSld>
   <p:clrMapOvr>
     <a:masterClrMapping/>
   </p:clrMapOvr>
+  <p:timing>
+    <p:tnLst>
+      <p:par>
+        <p:cTn xmlns:p14="http://schemas.microsoft.com/office/powerpoint/2010/main" id="1" dur="indefinite" restart="never" nodeType="tmRoot"/>
+      </p:par>
+    </p:tnLst>
+  </p:timing>
 </p:sld>
 </file>
 
@@ -3762,7 +3797,7 @@
           <a:p>
             <a:r>
               <a:rPr lang="en-US" dirty="0" smtClean="0"/>
-              <a:t>Final Report</a:t>
+              <a:t>Validation Steps</a:t>
             </a:r>
             <a:endParaRPr lang="en-US" dirty="0"/>
           </a:p>
@@ -3780,66 +3815,53 @@
         </p:nvSpPr>
         <p:spPr/>
         <p:txBody>
-          <a:bodyPr>
-            <a:normAutofit fontScale="92500" lnSpcReduction="10000"/>
-          </a:bodyPr>
-          <a:lstStyle/>
-          <a:p>
-            <a:r>
-              <a:rPr lang="en-US" dirty="0" smtClean="0"/>
-              <a:t>Project Description</a:t>
+          <a:bodyPr/>
+          <a:lstStyle/>
+          <a:p>
+            <a:r>
+              <a:rPr lang="en-US" dirty="0" smtClean="0"/>
+              <a:t>Met with Writers and Readers</a:t>
             </a:r>
           </a:p>
           <a:p>
             <a:pPr lvl="1"/>
             <a:r>
               <a:rPr lang="en-US" dirty="0" smtClean="0"/>
-              <a:t>Team, Client, Scope / Requirements, Benefits</a:t>
-            </a:r>
-          </a:p>
-          <a:p>
-            <a:r>
-              <a:rPr lang="en-US" dirty="0" smtClean="0"/>
-              <a:t>Project Design</a:t>
+              <a:t>Comments / changes desired for system</a:t>
             </a:r>
           </a:p>
           <a:p>
             <a:pPr lvl="1"/>
             <a:r>
               <a:rPr lang="en-US" dirty="0" smtClean="0"/>
-              <a:t>Interface Design, System Design, Code Design, Testing Design and Walkthrough</a:t>
-            </a:r>
-          </a:p>
-          <a:p>
-            <a:r>
-              <a:rPr lang="en-US" dirty="0" smtClean="0"/>
-              <a:t>Validation</a:t>
+              <a:t>Iterate</a:t>
+            </a:r>
+          </a:p>
+          <a:p>
+            <a:r>
+              <a:rPr lang="en-US" dirty="0" smtClean="0"/>
+              <a:t>Validation Meeting with Client</a:t>
             </a:r>
           </a:p>
           <a:p>
             <a:pPr lvl="1"/>
             <a:r>
               <a:rPr lang="en-US" dirty="0" smtClean="0"/>
-              <a:t>Client, Writers, and Reader Validation</a:t>
-            </a:r>
-          </a:p>
-          <a:p>
-            <a:r>
-              <a:rPr lang="en-US" dirty="0" smtClean="0"/>
-              <a:t>Documentation</a:t>
+              <a:t>Demonstrated system to the client</a:t>
             </a:r>
           </a:p>
           <a:p>
             <a:pPr lvl="1"/>
             <a:r>
               <a:rPr lang="en-US" dirty="0" smtClean="0"/>
-              <a:t>Code Walkthrough, User Training, Useful Links</a:t>
-            </a:r>
-          </a:p>
-          <a:p>
-            <a:r>
-              <a:rPr lang="en-US" dirty="0" smtClean="0"/>
-              <a:t>Project Handover</a:t>
+              <a:t>Asked what changes he would like</a:t>
+            </a:r>
+          </a:p>
+          <a:p>
+            <a:pPr lvl="1"/>
+            <a:r>
+              <a:rPr lang="en-US" dirty="0" smtClean="0"/>
+              <a:t>Iterated until he was 100% happy</a:t>
             </a:r>
             <a:endParaRPr lang="en-US" dirty="0"/>
           </a:p>
@@ -3848,13 +3870,20 @@
     </p:spTree>
     <p:extLst>
       <p:ext uri="{BB962C8B-B14F-4D97-AF65-F5344CB8AC3E}">
-        <p14:creationId xmlns:p14="http://schemas.microsoft.com/office/powerpoint/2010/main" val="2526524216"/>
+        <p14:creationId xmlns:p14="http://schemas.microsoft.com/office/powerpoint/2010/main" val="2464982024"/>
       </p:ext>
     </p:extLst>
   </p:cSld>
   <p:clrMapOvr>
     <a:masterClrMapping/>
   </p:clrMapOvr>
+  <p:timing>
+    <p:tnLst>
+      <p:par>
+        <p:cTn xmlns:p14="http://schemas.microsoft.com/office/powerpoint/2010/main" id="1" dur="indefinite" restart="never" nodeType="tmRoot"/>
+      </p:par>
+    </p:tnLst>
+  </p:timing>
 </p:sld>
 </file>
 
@@ -3892,7 +3921,7 @@
           <a:p>
             <a:r>
               <a:rPr lang="en-US" dirty="0" smtClean="0"/>
-              <a:t>Screencast Walkthroughs</a:t>
+              <a:t>Final Report</a:t>
             </a:r>
             <a:endParaRPr lang="en-US" dirty="0"/>
           </a:p>
@@ -3910,30 +3939,66 @@
         </p:nvSpPr>
         <p:spPr/>
         <p:txBody>
-          <a:bodyPr/>
-          <a:lstStyle/>
-          <a:p>
-            <a:r>
-              <a:rPr lang="en-US" dirty="0" smtClean="0"/>
-              <a:t>Deployment of System Important</a:t>
-            </a:r>
-          </a:p>
-          <a:p>
-            <a:r>
-              <a:rPr lang="en-US" dirty="0" smtClean="0"/>
-              <a:t>Series of Screencasts Demonstrate How to Deploy, with Narrative</a:t>
-            </a:r>
-          </a:p>
-          <a:p>
-            <a:r>
-              <a:rPr lang="en-US" dirty="0" smtClean="0"/>
-              <a:t>Deployed to a clean install of Ubuntu Virtual Machine</a:t>
-            </a:r>
-          </a:p>
-          <a:p>
-            <a:r>
-              <a:rPr lang="en-US" dirty="0" smtClean="0"/>
-              <a:t>Virtual Machine included in handover material</a:t>
+          <a:bodyPr>
+            <a:normAutofit fontScale="92500" lnSpcReduction="10000"/>
+          </a:bodyPr>
+          <a:lstStyle/>
+          <a:p>
+            <a:r>
+              <a:rPr lang="en-US" dirty="0" smtClean="0"/>
+              <a:t>Project Description</a:t>
+            </a:r>
+          </a:p>
+          <a:p>
+            <a:pPr lvl="1"/>
+            <a:r>
+              <a:rPr lang="en-US" dirty="0" smtClean="0"/>
+              <a:t>Team, Client, Scope / Requirements, Benefits</a:t>
+            </a:r>
+          </a:p>
+          <a:p>
+            <a:r>
+              <a:rPr lang="en-US" dirty="0" smtClean="0"/>
+              <a:t>Project Design</a:t>
+            </a:r>
+          </a:p>
+          <a:p>
+            <a:pPr lvl="1"/>
+            <a:r>
+              <a:rPr lang="en-US" dirty="0" smtClean="0"/>
+              <a:t>Interface Design, System Design, Code Design, Testing Design and Walkthrough</a:t>
+            </a:r>
+          </a:p>
+          <a:p>
+            <a:r>
+              <a:rPr lang="en-US" dirty="0" smtClean="0"/>
+              <a:t>Validation</a:t>
+            </a:r>
+          </a:p>
+          <a:p>
+            <a:pPr lvl="1"/>
+            <a:r>
+              <a:rPr lang="en-US" dirty="0" smtClean="0"/>
+              <a:t>Client, Writers, and Reader Validation</a:t>
+            </a:r>
+          </a:p>
+          <a:p>
+            <a:r>
+              <a:rPr lang="en-US" dirty="0" smtClean="0"/>
+              <a:t>Documentation</a:t>
+            </a:r>
+          </a:p>
+          <a:p>
+            <a:pPr lvl="1"/>
+            <a:r>
+              <a:rPr lang="en-US" dirty="0" smtClean="0"/>
+              <a:t>Code Walkthrough, User Training, Useful Links</a:t>
+            </a:r>
+          </a:p>
+          <a:p>
+            <a:r>
+              <a:rPr lang="en-US" dirty="0" smtClean="0"/>
+              <a:t>Project Handover</a:t>
             </a:r>
             <a:endParaRPr lang="en-US" dirty="0"/>
           </a:p>
@@ -3942,13 +4007,20 @@
     </p:spTree>
     <p:extLst>
       <p:ext uri="{BB962C8B-B14F-4D97-AF65-F5344CB8AC3E}">
-        <p14:creationId xmlns:p14="http://schemas.microsoft.com/office/powerpoint/2010/main" val="1736300659"/>
+        <p14:creationId xmlns:p14="http://schemas.microsoft.com/office/powerpoint/2010/main" val="2526524216"/>
       </p:ext>
     </p:extLst>
   </p:cSld>
   <p:clrMapOvr>
     <a:masterClrMapping/>
   </p:clrMapOvr>
+  <p:timing>
+    <p:tnLst>
+      <p:par>
+        <p:cTn xmlns:p14="http://schemas.microsoft.com/office/powerpoint/2010/main" id="1" dur="indefinite" restart="never" nodeType="tmRoot"/>
+      </p:par>
+    </p:tnLst>
+  </p:timing>
 </p:sld>
 </file>
 
@@ -3986,7 +4058,7 @@
           <a:p>
             <a:r>
               <a:rPr lang="en-US" dirty="0" smtClean="0"/>
-              <a:t>Deployable System</a:t>
+              <a:t>Screencast Walkthroughs</a:t>
             </a:r>
             <a:endParaRPr lang="en-US" dirty="0"/>
           </a:p>
@@ -4004,55 +4076,30 @@
         </p:nvSpPr>
         <p:spPr/>
         <p:txBody>
-          <a:bodyPr>
-            <a:normAutofit lnSpcReduction="10000"/>
-          </a:bodyPr>
-          <a:lstStyle/>
-          <a:p>
-            <a:r>
-              <a:rPr lang="en-US" dirty="0">
-                <a:hlinkClick r:id="rId2"/>
-              </a:rPr>
-              <a:t>http://zachporges.com/cornelldailytech</a:t>
-            </a:r>
-            <a:r>
-              <a:rPr lang="en-US" dirty="0" smtClean="0">
-                <a:hlinkClick r:id="rId2"/>
-              </a:rPr>
-              <a:t>/</a:t>
-            </a:r>
-            <a:endParaRPr lang="en-US" dirty="0" smtClean="0"/>
-          </a:p>
-          <a:p>
-            <a:r>
-              <a:rPr lang="en-US" dirty="0" smtClean="0"/>
-              <a:t>All mandatory components of project complete</a:t>
-            </a:r>
-          </a:p>
-          <a:p>
-            <a:r>
-              <a:rPr lang="en-US" dirty="0" smtClean="0"/>
-              <a:t>1 out of 3 optional components complete</a:t>
-            </a:r>
-          </a:p>
-          <a:p>
-            <a:r>
-              <a:rPr lang="en-US" dirty="0" smtClean="0"/>
-              <a:t>We were ready to deploy to AWS (other optional component) but servers were not provided by the client in time</a:t>
-            </a:r>
-          </a:p>
-          <a:p>
-            <a:pPr lvl="1"/>
-            <a:r>
-              <a:rPr lang="en-US" dirty="0" smtClean="0"/>
-              <a:t>Numerous emails, text messages, and meetings</a:t>
-            </a:r>
-          </a:p>
-          <a:p>
-            <a:pPr lvl="1"/>
-            <a:r>
-              <a:rPr lang="en-US" dirty="0" smtClean="0"/>
-              <a:t>Requested that they be ready by 11/15 at start of project, as of today we still do not have access</a:t>
+          <a:bodyPr/>
+          <a:lstStyle/>
+          <a:p>
+            <a:r>
+              <a:rPr lang="en-US" dirty="0" smtClean="0"/>
+              <a:t>Deployment of System Important</a:t>
+            </a:r>
+          </a:p>
+          <a:p>
+            <a:r>
+              <a:rPr lang="en-US" dirty="0" smtClean="0"/>
+              <a:t>Series of Screencasts Demonstrate How to Deploy, with Narrative</a:t>
+            </a:r>
+          </a:p>
+          <a:p>
+            <a:r>
+              <a:rPr lang="en-US" dirty="0" smtClean="0"/>
+              <a:t>Deployed to a clean install of Ubuntu Virtual Machine</a:t>
+            </a:r>
+          </a:p>
+          <a:p>
+            <a:r>
+              <a:rPr lang="en-US" dirty="0" smtClean="0"/>
+              <a:t>Virtual Machine included in handover material</a:t>
             </a:r>
             <a:endParaRPr lang="en-US" dirty="0"/>
           </a:p>
@@ -4061,13 +4108,20 @@
     </p:spTree>
     <p:extLst>
       <p:ext uri="{BB962C8B-B14F-4D97-AF65-F5344CB8AC3E}">
-        <p14:creationId xmlns:p14="http://schemas.microsoft.com/office/powerpoint/2010/main" val="1471375453"/>
+        <p14:creationId xmlns:p14="http://schemas.microsoft.com/office/powerpoint/2010/main" val="1736300659"/>
       </p:ext>
     </p:extLst>
   </p:cSld>
   <p:clrMapOvr>
     <a:masterClrMapping/>
   </p:clrMapOvr>
+  <p:timing>
+    <p:tnLst>
+      <p:par>
+        <p:cTn xmlns:p14="http://schemas.microsoft.com/office/powerpoint/2010/main" id="1" dur="indefinite" restart="never" nodeType="tmRoot"/>
+      </p:par>
+    </p:tnLst>
+  </p:timing>
 </p:sld>
 </file>
 
@@ -4105,6 +4159,132 @@
           <a:p>
             <a:r>
               <a:rPr lang="en-US" dirty="0" smtClean="0"/>
+              <a:t>Deployable System</a:t>
+            </a:r>
+            <a:endParaRPr lang="en-US" dirty="0"/>
+          </a:p>
+        </p:txBody>
+      </p:sp>
+      <p:sp>
+        <p:nvSpPr>
+          <p:cNvPr id="3" name="Content Placeholder 2"/>
+          <p:cNvSpPr>
+            <a:spLocks noGrp="1"/>
+          </p:cNvSpPr>
+          <p:nvPr>
+            <p:ph idx="1"/>
+          </p:nvPr>
+        </p:nvSpPr>
+        <p:spPr/>
+        <p:txBody>
+          <a:bodyPr>
+            <a:normAutofit lnSpcReduction="10000"/>
+          </a:bodyPr>
+          <a:lstStyle/>
+          <a:p>
+            <a:r>
+              <a:rPr lang="en-US" dirty="0">
+                <a:hlinkClick r:id="rId2"/>
+              </a:rPr>
+              <a:t>http://zachporges.com/cornelldailytech</a:t>
+            </a:r>
+            <a:r>
+              <a:rPr lang="en-US" dirty="0" smtClean="0">
+                <a:hlinkClick r:id="rId2"/>
+              </a:rPr>
+              <a:t>/</a:t>
+            </a:r>
+            <a:endParaRPr lang="en-US" dirty="0" smtClean="0"/>
+          </a:p>
+          <a:p>
+            <a:r>
+              <a:rPr lang="en-US" dirty="0" smtClean="0"/>
+              <a:t>All mandatory components of project complete</a:t>
+            </a:r>
+          </a:p>
+          <a:p>
+            <a:r>
+              <a:rPr lang="en-US" dirty="0" smtClean="0"/>
+              <a:t>1 out of 3 optional components complete</a:t>
+            </a:r>
+          </a:p>
+          <a:p>
+            <a:r>
+              <a:rPr lang="en-US" dirty="0" smtClean="0"/>
+              <a:t>We were ready to deploy to AWS (other optional component) but servers were not provided by the client in time</a:t>
+            </a:r>
+          </a:p>
+          <a:p>
+            <a:pPr lvl="1"/>
+            <a:r>
+              <a:rPr lang="en-US" dirty="0" smtClean="0"/>
+              <a:t>Numerous emails, text messages, and meetings</a:t>
+            </a:r>
+          </a:p>
+          <a:p>
+            <a:pPr lvl="1"/>
+            <a:r>
+              <a:rPr lang="en-US" dirty="0" smtClean="0"/>
+              <a:t>Requested that they be ready by 11/15 at start of project, as of today we still do not have access</a:t>
+            </a:r>
+            <a:endParaRPr lang="en-US" dirty="0"/>
+          </a:p>
+        </p:txBody>
+      </p:sp>
+    </p:spTree>
+    <p:extLst>
+      <p:ext uri="{BB962C8B-B14F-4D97-AF65-F5344CB8AC3E}">
+        <p14:creationId xmlns:p14="http://schemas.microsoft.com/office/powerpoint/2010/main" val="1471375453"/>
+      </p:ext>
+    </p:extLst>
+  </p:cSld>
+  <p:clrMapOvr>
+    <a:masterClrMapping/>
+  </p:clrMapOvr>
+  <p:timing>
+    <p:tnLst>
+      <p:par>
+        <p:cTn xmlns:p14="http://schemas.microsoft.com/office/powerpoint/2010/main" id="1" dur="indefinite" restart="never" nodeType="tmRoot"/>
+      </p:par>
+    </p:tnLst>
+  </p:timing>
+</p:sld>
+</file>
+
+<file path=ppt/slides/slide15.xml><?xml version="1.0" encoding="utf-8"?>
+<p:sld xmlns:a="http://schemas.openxmlformats.org/drawingml/2006/main" xmlns:r="http://schemas.openxmlformats.org/officeDocument/2006/relationships" xmlns:p="http://schemas.openxmlformats.org/presentationml/2006/main">
+  <p:cSld>
+    <p:spTree>
+      <p:nvGrpSpPr>
+        <p:cNvPr id="1" name=""/>
+        <p:cNvGrpSpPr/>
+        <p:nvPr/>
+      </p:nvGrpSpPr>
+      <p:grpSpPr>
+        <a:xfrm>
+          <a:off x="0" y="0"/>
+          <a:ext cx="0" cy="0"/>
+          <a:chOff x="0" y="0"/>
+          <a:chExt cx="0" cy="0"/>
+        </a:xfrm>
+      </p:grpSpPr>
+      <p:sp>
+        <p:nvSpPr>
+          <p:cNvPr id="2" name="Title 1"/>
+          <p:cNvSpPr>
+            <a:spLocks noGrp="1"/>
+          </p:cNvSpPr>
+          <p:nvPr>
+            <p:ph type="title"/>
+          </p:nvPr>
+        </p:nvSpPr>
+        <p:spPr/>
+        <p:txBody>
+          <a:bodyPr/>
+          <a:lstStyle/>
+          <a:p>
+            <a:r>
+              <a:rPr lang="en-US" dirty="0" smtClean="0"/>
               <a:t>Final Summary</a:t>
             </a:r>
             <a:endParaRPr lang="en-US" dirty="0"/>
@@ -4179,7 +4359,6 @@
               <a:rPr lang="en-US" dirty="0"/>
               <a:t>, Screencast Walkthroughs, Deployable System</a:t>
             </a:r>
-            <a:endParaRPr lang="en-US" dirty="0"/>
           </a:p>
         </p:txBody>
       </p:sp>
@@ -4193,6 +4372,13 @@
   <p:clrMapOvr>
     <a:masterClrMapping/>
   </p:clrMapOvr>
+  <p:timing>
+    <p:tnLst>
+      <p:par>
+        <p:cTn xmlns:p14="http://schemas.microsoft.com/office/powerpoint/2010/main" id="1" dur="indefinite" restart="never" nodeType="tmRoot"/>
+      </p:par>
+    </p:tnLst>
+  </p:timing>
 </p:sld>
 </file>
 
@@ -4290,7 +4476,6 @@
               <a:rPr lang="en-US" dirty="0" smtClean="0"/>
               <a:t>Validation Steps</a:t>
             </a:r>
-            <a:endParaRPr lang="en-US" dirty="0" smtClean="0"/>
           </a:p>
           <a:p>
             <a:r>
@@ -4312,7 +4497,6 @@
               <a:rPr lang="en-US" dirty="0" smtClean="0"/>
               <a:t>, Screencast Walkthroughs, Deployable System</a:t>
             </a:r>
-            <a:endParaRPr lang="en-US" dirty="0" smtClean="0"/>
           </a:p>
           <a:p>
             <a:endParaRPr lang="en-US" dirty="0" smtClean="0"/>
@@ -4329,6 +4513,13 @@
   <p:clrMapOvr>
     <a:masterClrMapping/>
   </p:clrMapOvr>
+  <p:timing>
+    <p:tnLst>
+      <p:par>
+        <p:cTn xmlns:p14="http://schemas.microsoft.com/office/powerpoint/2010/main" id="1" dur="indefinite" restart="never" nodeType="tmRoot"/>
+      </p:par>
+    </p:tnLst>
+  </p:timing>
 </p:sld>
 </file>
 
@@ -4422,6 +4613,13 @@
   <p:clrMapOvr>
     <a:masterClrMapping/>
   </p:clrMapOvr>
+  <p:timing>
+    <p:tnLst>
+      <p:par>
+        <p:cTn xmlns:p14="http://schemas.microsoft.com/office/powerpoint/2010/main" id="1" dur="indefinite" restart="never" nodeType="tmRoot"/>
+      </p:par>
+    </p:tnLst>
+  </p:timing>
 </p:sld>
 </file>
 
@@ -4526,6 +4724,13 @@
   <p:clrMapOvr>
     <a:masterClrMapping/>
   </p:clrMapOvr>
+  <p:timing>
+    <p:tnLst>
+      <p:par>
+        <p:cTn xmlns:p14="http://schemas.microsoft.com/office/powerpoint/2010/main" id="1" dur="indefinite" restart="never" nodeType="tmRoot"/>
+      </p:par>
+    </p:tnLst>
+  </p:timing>
 </p:sld>
 </file>
 
@@ -4628,6 +4833,13 @@
   <p:clrMapOvr>
     <a:masterClrMapping/>
   </p:clrMapOvr>
+  <p:timing>
+    <p:tnLst>
+      <p:par>
+        <p:cTn xmlns:p14="http://schemas.microsoft.com/office/powerpoint/2010/main" id="1" dur="indefinite" restart="never" nodeType="tmRoot"/>
+      </p:par>
+    </p:tnLst>
+  </p:timing>
 </p:sld>
 </file>
 
@@ -4711,6 +4923,13 @@
   <p:clrMapOvr>
     <a:masterClrMapping/>
   </p:clrMapOvr>
+  <p:timing>
+    <p:tnLst>
+      <p:par>
+        <p:cTn xmlns:p14="http://schemas.microsoft.com/office/powerpoint/2010/main" id="1" dur="indefinite" restart="never" nodeType="tmRoot"/>
+      </p:par>
+    </p:tnLst>
+  </p:timing>
 </p:sld>
 </file>
 
@@ -4794,6 +5013,13 @@
   <p:clrMapOvr>
     <a:masterClrMapping/>
   </p:clrMapOvr>
+  <p:timing>
+    <p:tnLst>
+      <p:par>
+        <p:cTn xmlns:p14="http://schemas.microsoft.com/office/powerpoint/2010/main" id="1" dur="indefinite" restart="never" nodeType="tmRoot"/>
+      </p:par>
+    </p:tnLst>
+  </p:timing>
 </p:sld>
 </file>
 
@@ -4831,82 +5057,54 @@
           <a:p>
             <a:r>
               <a:rPr lang="en-US" dirty="0" smtClean="0"/>
-              <a:t>Project Components</a:t>
+              <a:t>Operation Overview</a:t>
             </a:r>
             <a:endParaRPr lang="en-US" dirty="0"/>
           </a:p>
         </p:txBody>
       </p:sp>
-      <p:sp>
-        <p:nvSpPr>
-          <p:cNvPr id="3" name="Content Placeholder 2"/>
-          <p:cNvSpPr>
-            <a:spLocks noGrp="1"/>
-          </p:cNvSpPr>
+      <p:pic>
+        <p:nvPicPr>
+          <p:cNvPr id="4" name="Content Placeholder 3" descr="overview_diagram.png"/>
+          <p:cNvPicPr>
+            <a:picLocks noGrp="1" noChangeAspect="1"/>
+          </p:cNvPicPr>
           <p:nvPr>
             <p:ph idx="1"/>
           </p:nvPr>
-        </p:nvSpPr>
-        <p:spPr/>
-        <p:txBody>
-          <a:bodyPr/>
-          <a:lstStyle/>
-          <a:p>
-            <a:r>
-              <a:rPr lang="en-US" dirty="0" smtClean="0"/>
-              <a:t>Website, CMS, and Drupal Extensions are complete, tested, and deployed</a:t>
-            </a:r>
-          </a:p>
-          <a:p>
-            <a:pPr lvl="1"/>
-            <a:r>
-              <a:rPr lang="en-US" dirty="0">
-                <a:hlinkClick r:id="rId2"/>
-              </a:rPr>
-              <a:t>http://zachporges.com/</a:t>
-            </a:r>
-            <a:r>
-              <a:rPr lang="en-US" dirty="0" smtClean="0">
-                <a:hlinkClick r:id="rId2"/>
-              </a:rPr>
-              <a:t>cornelldailytech</a:t>
-            </a:r>
-            <a:endParaRPr lang="en-US" dirty="0"/>
-          </a:p>
-          <a:p>
-            <a:r>
-              <a:rPr lang="en-US" dirty="0" smtClean="0"/>
-              <a:t>Database, Shared Library, RSS Parser, and Data Fusion Library are complete and tested</a:t>
-            </a:r>
-          </a:p>
-          <a:p>
-            <a:pPr lvl="1"/>
-            <a:r>
-              <a:rPr lang="en-US" dirty="0" smtClean="0"/>
-              <a:t>Deployment not possible due to lack of servers</a:t>
-            </a:r>
-          </a:p>
-          <a:p>
-            <a:r>
-              <a:rPr lang="en-US" dirty="0" smtClean="0"/>
-              <a:t>Java components that run standalone on server utilize Log4J logging</a:t>
-            </a:r>
-          </a:p>
-          <a:p>
-            <a:endParaRPr lang="en-US" dirty="0"/>
-          </a:p>
-        </p:txBody>
-      </p:sp>
+        </p:nvPicPr>
+        <p:blipFill>
+          <a:blip r:embed="rId2">
+            <a:extLst>
+              <a:ext uri="{28A0092B-C50C-407E-A947-70E740481C1C}">
+                <a14:useLocalDpi xmlns:a14="http://schemas.microsoft.com/office/drawing/2010/main" val="0"/>
+              </a:ext>
+            </a:extLst>
+          </a:blip>
+          <a:srcRect t="-4793" b="-4793"/>
+          <a:stretch>
+            <a:fillRect/>
+          </a:stretch>
+        </p:blipFill>
+        <p:spPr/>
+      </p:pic>
     </p:spTree>
     <p:extLst>
       <p:ext uri="{BB962C8B-B14F-4D97-AF65-F5344CB8AC3E}">
-        <p14:creationId xmlns:p14="http://schemas.microsoft.com/office/powerpoint/2010/main" val="162324330"/>
+        <p14:creationId xmlns:p14="http://schemas.microsoft.com/office/powerpoint/2010/main" val="1557874472"/>
       </p:ext>
     </p:extLst>
   </p:cSld>
   <p:clrMapOvr>
     <a:masterClrMapping/>
   </p:clrMapOvr>
+  <p:timing>
+    <p:tnLst>
+      <p:par>
+        <p:cTn xmlns:p14="http://schemas.microsoft.com/office/powerpoint/2010/main" id="1" dur="indefinite" restart="never" nodeType="tmRoot"/>
+      </p:par>
+    </p:tnLst>
+  </p:timing>
 </p:sld>
 </file>
 
@@ -4944,7 +5142,7 @@
           <a:p>
             <a:r>
               <a:rPr lang="en-US" dirty="0" smtClean="0"/>
-              <a:t>Testing Steps</a:t>
+              <a:t>Project Components</a:t>
             </a:r>
             <a:endParaRPr lang="en-US" dirty="0"/>
           </a:p>
@@ -4962,74 +5160,50 @@
         </p:nvSpPr>
         <p:spPr/>
         <p:txBody>
-          <a:bodyPr>
-            <a:normAutofit fontScale="92500" lnSpcReduction="20000"/>
-          </a:bodyPr>
-          <a:lstStyle/>
-          <a:p>
-            <a:r>
-              <a:rPr lang="en-US" dirty="0" smtClean="0"/>
-              <a:t>Testing Website</a:t>
+          <a:bodyPr/>
+          <a:lstStyle/>
+          <a:p>
+            <a:r>
+              <a:rPr lang="en-US" dirty="0" smtClean="0"/>
+              <a:t>Website, CMS, and Drupal Extensions are complete, tested, and deployed</a:t>
             </a:r>
           </a:p>
           <a:p>
             <a:pPr lvl="1"/>
             <a:r>
-              <a:rPr lang="en-US" dirty="0" smtClean="0"/>
-              <a:t> Client and user testing, manual testing by visiting and exercising components</a:t>
-            </a:r>
-          </a:p>
-          <a:p>
-            <a:r>
-              <a:rPr lang="en-US" dirty="0" smtClean="0"/>
-              <a:t>Testing Drupal Extensions</a:t>
+              <a:rPr lang="en-US" dirty="0">
+                <a:hlinkClick r:id="rId2"/>
+              </a:rPr>
+              <a:t>http://zachporges.com/</a:t>
+            </a:r>
+            <a:r>
+              <a:rPr lang="en-US" dirty="0" smtClean="0">
+                <a:hlinkClick r:id="rId2"/>
+              </a:rPr>
+              <a:t>cornelldailytech</a:t>
+            </a:r>
+            <a:endParaRPr lang="en-US" dirty="0"/>
+          </a:p>
+          <a:p>
+            <a:r>
+              <a:rPr lang="en-US" dirty="0" smtClean="0"/>
+              <a:t>Database, Shared Library, RSS Parser, and Data Fusion Library are complete and tested</a:t>
             </a:r>
           </a:p>
           <a:p>
             <a:pPr lvl="1"/>
             <a:r>
               <a:rPr lang="en-US" dirty="0" smtClean="0"/>
-              <a:t>Manual testing by exercising all use cases and boundary cases of system</a:t>
-            </a:r>
-          </a:p>
-          <a:p>
-            <a:r>
-              <a:rPr lang="en-US" dirty="0" smtClean="0"/>
-              <a:t>Testing Shared Library</a:t>
-            </a:r>
-          </a:p>
-          <a:p>
-            <a:pPr lvl="1"/>
-            <a:r>
-              <a:rPr lang="en-US" dirty="0" smtClean="0"/>
-              <a:t>Manual end to end tests as well as Unit testing</a:t>
-            </a:r>
-          </a:p>
-          <a:p>
-            <a:r>
-              <a:rPr lang="en-US" dirty="0" smtClean="0"/>
-              <a:t>Testing RSS Parsing</a:t>
-            </a:r>
-          </a:p>
-          <a:p>
-            <a:pPr lvl="1"/>
-            <a:r>
-              <a:rPr lang="en-US" dirty="0" smtClean="0"/>
-              <a:t>Manual end to end tests</a:t>
-            </a:r>
-          </a:p>
-          <a:p>
-            <a:r>
-              <a:rPr lang="en-US" dirty="0" smtClean="0"/>
-              <a:t>Testing Data Fusion</a:t>
-            </a:r>
-          </a:p>
-          <a:p>
-            <a:pPr lvl="1"/>
-            <a:r>
-              <a:rPr lang="en-US" dirty="0" smtClean="0"/>
-              <a:t>Manual end to end tests with example fusion</a:t>
-            </a:r>
+              <a:t>Deployment not possible due to lack of servers</a:t>
+            </a:r>
+          </a:p>
+          <a:p>
+            <a:r>
+              <a:rPr lang="en-US" dirty="0" smtClean="0"/>
+              <a:t>Java components that run standalone on server utilize Log4J logging</a:t>
+            </a:r>
+          </a:p>
+          <a:p>
             <a:endParaRPr lang="en-US" dirty="0"/>
           </a:p>
         </p:txBody>
@@ -5037,13 +5211,20 @@
     </p:spTree>
     <p:extLst>
       <p:ext uri="{BB962C8B-B14F-4D97-AF65-F5344CB8AC3E}">
-        <p14:creationId xmlns:p14="http://schemas.microsoft.com/office/powerpoint/2010/main" val="2262376755"/>
+        <p14:creationId xmlns:p14="http://schemas.microsoft.com/office/powerpoint/2010/main" val="162324330"/>
       </p:ext>
     </p:extLst>
   </p:cSld>
   <p:clrMapOvr>
     <a:masterClrMapping/>
   </p:clrMapOvr>
+  <p:timing>
+    <p:tnLst>
+      <p:par>
+        <p:cTn xmlns:p14="http://schemas.microsoft.com/office/powerpoint/2010/main" id="1" dur="indefinite" restart="never" nodeType="tmRoot"/>
+      </p:par>
+    </p:tnLst>
+  </p:timing>
 </p:sld>
 </file>
 

</xml_diff>